<commit_message>
Fixed oversized font on one slide.
</commit_message>
<xml_diff>
--- a/Milestone 3/Milestone 3.pptx
+++ b/Milestone 3/Milestone 3.pptx
@@ -5776,11 +5776,11 @@
               <a:defRPr/>
             </a:pPr>
             <a:r>
-              <a:rPr lang="en-CA" b="1" dirty="0"/>
+              <a:rPr lang="en-CA" sz="2200" b="1" dirty="0"/>
               <a:t>Approver Notification </a:t>
             </a:r>
             <a:r>
-              <a:rPr lang="en-CA" dirty="0"/>
+              <a:rPr lang="en-CA" sz="2200" dirty="0"/>
               <a:t>- As an approver, I want to be notified when a new request has been made for a tool under my domain so that I can respond to it promptly.</a:t>
             </a:r>
           </a:p>
@@ -5805,11 +5805,11 @@
               <a:defRPr/>
             </a:pPr>
             <a:r>
-              <a:rPr lang="en-CA" b="1" dirty="0"/>
+              <a:rPr lang="en-CA" sz="2200" b="1" dirty="0"/>
               <a:t>Analyst Notification </a:t>
             </a:r>
             <a:r>
-              <a:rPr lang="en-CA" dirty="0"/>
+              <a:rPr lang="en-CA" sz="2200" dirty="0"/>
               <a:t>- As an analyst, I want to be notified when a request has been approved so that I can promptly process the ticket and make the final decision.</a:t>
             </a:r>
           </a:p>
@@ -5834,11 +5834,11 @@
               <a:defRPr/>
             </a:pPr>
             <a:r>
-              <a:rPr lang="en-CA" b="1" dirty="0"/>
+              <a:rPr lang="en-CA" sz="2200" b="1" dirty="0"/>
               <a:t>User Notification </a:t>
             </a:r>
             <a:r>
-              <a:rPr lang="en-CA" dirty="0"/>
+              <a:rPr lang="en-CA" sz="2200" dirty="0"/>
               <a:t>- As a user, I want to be notified when the request has been approved or denied so that I can begin using the software or discover why I was denied access.</a:t>
             </a:r>
           </a:p>

</xml_diff>